<commit_message>
adds contributor_payee_class column to working_transactions
</commit_message>
<xml_diff>
--- a/dataNotes.pptx
+++ b/dataNotes.pptx
@@ -4,6 +4,9 @@
   <p:sldMasterIdLst>
     <p:sldMasterId id="2147484114" r:id="rId1"/>
   </p:sldMasterIdLst>
+  <p:notesMasterIdLst>
+    <p:notesMasterId r:id="rId15"/>
+  </p:notesMasterIdLst>
   <p:sldIdLst>
     <p:sldId id="256" r:id="rId2"/>
     <p:sldId id="257" r:id="rId3"/>
@@ -15,6 +18,9 @@
     <p:sldId id="264" r:id="rId9"/>
     <p:sldId id="267" r:id="rId10"/>
     <p:sldId id="265" r:id="rId11"/>
+    <p:sldId id="268" r:id="rId12"/>
+    <p:sldId id="269" r:id="rId13"/>
+    <p:sldId id="270" r:id="rId14"/>
   </p:sldIdLst>
   <p:sldSz cx="9144000" cy="6858000" type="screen4x3"/>
   <p:notesSz cx="6858000" cy="9144000"/>
@@ -114,6 +120,557 @@
     </a:lvl9pPr>
   </p:defaultTextStyle>
 </p:presentation>
+</file>
+
+<file path=ppt/notesMasters/notesMaster1.xml><?xml version="1.0" encoding="utf-8"?>
+<p:notesMaster xmlns:a="http://schemas.openxmlformats.org/drawingml/2006/main" xmlns:r="http://schemas.openxmlformats.org/officeDocument/2006/relationships" xmlns:mc="http://schemas.openxmlformats.org/markup-compatibility/2006" xmlns:mv="urn:schemas-microsoft-com:mac:vml" xmlns:p="http://schemas.openxmlformats.org/presentationml/2006/main" mc:Ignorable="mv" mc:PreserveAttributes="mv:*">
+  <p:cSld>
+    <p:bg>
+      <p:bgRef idx="1001">
+        <a:schemeClr val="bg1"/>
+      </p:bgRef>
+    </p:bg>
+    <p:spTree>
+      <p:nvGrpSpPr>
+        <p:cNvPr id="1" name=""/>
+        <p:cNvGrpSpPr/>
+        <p:nvPr/>
+      </p:nvGrpSpPr>
+      <p:grpSpPr>
+        <a:xfrm>
+          <a:off x="0" y="0"/>
+          <a:ext cx="0" cy="0"/>
+          <a:chOff x="0" y="0"/>
+          <a:chExt cx="0" cy="0"/>
+        </a:xfrm>
+      </p:grpSpPr>
+      <p:sp>
+        <p:nvSpPr>
+          <p:cNvPr id="2" name="Header Placeholder 1"/>
+          <p:cNvSpPr>
+            <a:spLocks noGrp="1"/>
+          </p:cNvSpPr>
+          <p:nvPr>
+            <p:ph type="hdr" sz="quarter"/>
+          </p:nvPr>
+        </p:nvSpPr>
+        <p:spPr>
+          <a:xfrm>
+            <a:off x="0" y="0"/>
+            <a:ext cx="2971800" cy="457200"/>
+          </a:xfrm>
+          <a:prstGeom prst="rect">
+            <a:avLst/>
+          </a:prstGeom>
+        </p:spPr>
+        <p:txBody>
+          <a:bodyPr vert="horz" lIns="91440" tIns="45720" rIns="91440" bIns="45720" rtlCol="0"/>
+          <a:lstStyle>
+            <a:lvl1pPr algn="l">
+              <a:defRPr sz="1200"/>
+            </a:lvl1pPr>
+          </a:lstStyle>
+          <a:p>
+            <a:endParaRPr lang="en-US"/>
+          </a:p>
+        </p:txBody>
+      </p:sp>
+      <p:sp>
+        <p:nvSpPr>
+          <p:cNvPr id="3" name="Date Placeholder 2"/>
+          <p:cNvSpPr>
+            <a:spLocks noGrp="1"/>
+          </p:cNvSpPr>
+          <p:nvPr>
+            <p:ph type="dt" idx="1"/>
+          </p:nvPr>
+        </p:nvSpPr>
+        <p:spPr>
+          <a:xfrm>
+            <a:off x="3884613" y="0"/>
+            <a:ext cx="2971800" cy="457200"/>
+          </a:xfrm>
+          <a:prstGeom prst="rect">
+            <a:avLst/>
+          </a:prstGeom>
+        </p:spPr>
+        <p:txBody>
+          <a:bodyPr vert="horz" lIns="91440" tIns="45720" rIns="91440" bIns="45720" rtlCol="0"/>
+          <a:lstStyle>
+            <a:lvl1pPr algn="r">
+              <a:defRPr sz="1200"/>
+            </a:lvl1pPr>
+          </a:lstStyle>
+          <a:p>
+            <a:fld id="{DE7D5A24-7355-5A41-A29D-C4936BB898F7}" type="datetimeFigureOut">
+              <a:rPr lang="en-US" smtClean="0"/>
+              <a:t>10/17/14</a:t>
+            </a:fld>
+            <a:endParaRPr lang="en-US"/>
+          </a:p>
+        </p:txBody>
+      </p:sp>
+      <p:sp>
+        <p:nvSpPr>
+          <p:cNvPr id="4" name="Slide Image Placeholder 3"/>
+          <p:cNvSpPr>
+            <a:spLocks noGrp="1" noRot="1" noChangeAspect="1"/>
+          </p:cNvSpPr>
+          <p:nvPr>
+            <p:ph type="sldImg" idx="2"/>
+          </p:nvPr>
+        </p:nvSpPr>
+        <p:spPr>
+          <a:xfrm>
+            <a:off x="1143000" y="685800"/>
+            <a:ext cx="4572000" cy="3429000"/>
+          </a:xfrm>
+          <a:prstGeom prst="rect">
+            <a:avLst/>
+          </a:prstGeom>
+          <a:noFill/>
+          <a:ln w="12700">
+            <a:solidFill>
+              <a:prstClr val="black"/>
+            </a:solidFill>
+          </a:ln>
+        </p:spPr>
+        <p:txBody>
+          <a:bodyPr vert="horz" lIns="91440" tIns="45720" rIns="91440" bIns="45720" rtlCol="0" anchor="ctr"/>
+          <a:lstStyle/>
+          <a:p>
+            <a:endParaRPr lang="en-US"/>
+          </a:p>
+        </p:txBody>
+      </p:sp>
+      <p:sp>
+        <p:nvSpPr>
+          <p:cNvPr id="5" name="Notes Placeholder 4"/>
+          <p:cNvSpPr>
+            <a:spLocks noGrp="1"/>
+          </p:cNvSpPr>
+          <p:nvPr>
+            <p:ph type="body" sz="quarter" idx="3"/>
+          </p:nvPr>
+        </p:nvSpPr>
+        <p:spPr>
+          <a:xfrm>
+            <a:off x="685800" y="4343400"/>
+            <a:ext cx="5486400" cy="4114800"/>
+          </a:xfrm>
+          <a:prstGeom prst="rect">
+            <a:avLst/>
+          </a:prstGeom>
+        </p:spPr>
+        <p:txBody>
+          <a:bodyPr vert="horz" lIns="91440" tIns="45720" rIns="91440" bIns="45720" rtlCol="0">
+            <a:normAutofit/>
+          </a:bodyPr>
+          <a:lstStyle/>
+          <a:p>
+            <a:pPr lvl="0"/>
+            <a:r>
+              <a:rPr lang="en-US" smtClean="0"/>
+              <a:t>Click to edit Master text styles</a:t>
+            </a:r>
+          </a:p>
+          <a:p>
+            <a:pPr lvl="1"/>
+            <a:r>
+              <a:rPr lang="en-US" smtClean="0"/>
+              <a:t>Second level</a:t>
+            </a:r>
+          </a:p>
+          <a:p>
+            <a:pPr lvl="2"/>
+            <a:r>
+              <a:rPr lang="en-US" smtClean="0"/>
+              <a:t>Third level</a:t>
+            </a:r>
+          </a:p>
+          <a:p>
+            <a:pPr lvl="3"/>
+            <a:r>
+              <a:rPr lang="en-US" smtClean="0"/>
+              <a:t>Fourth level</a:t>
+            </a:r>
+          </a:p>
+          <a:p>
+            <a:pPr lvl="4"/>
+            <a:r>
+              <a:rPr lang="en-US" smtClean="0"/>
+              <a:t>Fifth level</a:t>
+            </a:r>
+            <a:endParaRPr lang="en-US"/>
+          </a:p>
+        </p:txBody>
+      </p:sp>
+      <p:sp>
+        <p:nvSpPr>
+          <p:cNvPr id="6" name="Footer Placeholder 5"/>
+          <p:cNvSpPr>
+            <a:spLocks noGrp="1"/>
+          </p:cNvSpPr>
+          <p:nvPr>
+            <p:ph type="ftr" sz="quarter" idx="4"/>
+          </p:nvPr>
+        </p:nvSpPr>
+        <p:spPr>
+          <a:xfrm>
+            <a:off x="0" y="8685213"/>
+            <a:ext cx="2971800" cy="457200"/>
+          </a:xfrm>
+          <a:prstGeom prst="rect">
+            <a:avLst/>
+          </a:prstGeom>
+        </p:spPr>
+        <p:txBody>
+          <a:bodyPr vert="horz" lIns="91440" tIns="45720" rIns="91440" bIns="45720" rtlCol="0" anchor="b"/>
+          <a:lstStyle>
+            <a:lvl1pPr algn="l">
+              <a:defRPr sz="1200"/>
+            </a:lvl1pPr>
+          </a:lstStyle>
+          <a:p>
+            <a:endParaRPr lang="en-US"/>
+          </a:p>
+        </p:txBody>
+      </p:sp>
+      <p:sp>
+        <p:nvSpPr>
+          <p:cNvPr id="7" name="Slide Number Placeholder 6"/>
+          <p:cNvSpPr>
+            <a:spLocks noGrp="1"/>
+          </p:cNvSpPr>
+          <p:nvPr>
+            <p:ph type="sldNum" sz="quarter" idx="5"/>
+          </p:nvPr>
+        </p:nvSpPr>
+        <p:spPr>
+          <a:xfrm>
+            <a:off x="3884613" y="8685213"/>
+            <a:ext cx="2971800" cy="457200"/>
+          </a:xfrm>
+          <a:prstGeom prst="rect">
+            <a:avLst/>
+          </a:prstGeom>
+        </p:spPr>
+        <p:txBody>
+          <a:bodyPr vert="horz" lIns="91440" tIns="45720" rIns="91440" bIns="45720" rtlCol="0" anchor="b"/>
+          <a:lstStyle>
+            <a:lvl1pPr algn="r">
+              <a:defRPr sz="1200"/>
+            </a:lvl1pPr>
+          </a:lstStyle>
+          <a:p>
+            <a:fld id="{F0126D94-F4B7-A842-8164-58B78F1F8011}" type="slidenum">
+              <a:rPr lang="en-US" smtClean="0"/>
+              <a:t>‹#›</a:t>
+            </a:fld>
+            <a:endParaRPr lang="en-US"/>
+          </a:p>
+        </p:txBody>
+      </p:sp>
+    </p:spTree>
+  </p:cSld>
+  <p:clrMap bg1="lt1" tx1="dk1" bg2="lt2" tx2="dk2" accent1="accent1" accent2="accent2" accent3="accent3" accent4="accent4" accent5="accent5" accent6="accent6" hlink="hlink" folHlink="folHlink"/>
+  <p:notesStyle>
+    <a:lvl1pPr marL="0" algn="l" defTabSz="457200" rtl="0" eaLnBrk="1" latinLnBrk="0" hangingPunct="1">
+      <a:defRPr sz="1200" kern="1200">
+        <a:solidFill>
+          <a:schemeClr val="tx1"/>
+        </a:solidFill>
+        <a:latin typeface="+mn-lt"/>
+        <a:ea typeface="+mn-ea"/>
+        <a:cs typeface="+mn-cs"/>
+      </a:defRPr>
+    </a:lvl1pPr>
+    <a:lvl2pPr marL="457200" algn="l" defTabSz="457200" rtl="0" eaLnBrk="1" latinLnBrk="0" hangingPunct="1">
+      <a:defRPr sz="1200" kern="1200">
+        <a:solidFill>
+          <a:schemeClr val="tx1"/>
+        </a:solidFill>
+        <a:latin typeface="+mn-lt"/>
+        <a:ea typeface="+mn-ea"/>
+        <a:cs typeface="+mn-cs"/>
+      </a:defRPr>
+    </a:lvl2pPr>
+    <a:lvl3pPr marL="914400" algn="l" defTabSz="457200" rtl="0" eaLnBrk="1" latinLnBrk="0" hangingPunct="1">
+      <a:defRPr sz="1200" kern="1200">
+        <a:solidFill>
+          <a:schemeClr val="tx1"/>
+        </a:solidFill>
+        <a:latin typeface="+mn-lt"/>
+        <a:ea typeface="+mn-ea"/>
+        <a:cs typeface="+mn-cs"/>
+      </a:defRPr>
+    </a:lvl3pPr>
+    <a:lvl4pPr marL="1371600" algn="l" defTabSz="457200" rtl="0" eaLnBrk="1" latinLnBrk="0" hangingPunct="1">
+      <a:defRPr sz="1200" kern="1200">
+        <a:solidFill>
+          <a:schemeClr val="tx1"/>
+        </a:solidFill>
+        <a:latin typeface="+mn-lt"/>
+        <a:ea typeface="+mn-ea"/>
+        <a:cs typeface="+mn-cs"/>
+      </a:defRPr>
+    </a:lvl4pPr>
+    <a:lvl5pPr marL="1828800" algn="l" defTabSz="457200" rtl="0" eaLnBrk="1" latinLnBrk="0" hangingPunct="1">
+      <a:defRPr sz="1200" kern="1200">
+        <a:solidFill>
+          <a:schemeClr val="tx1"/>
+        </a:solidFill>
+        <a:latin typeface="+mn-lt"/>
+        <a:ea typeface="+mn-ea"/>
+        <a:cs typeface="+mn-cs"/>
+      </a:defRPr>
+    </a:lvl5pPr>
+    <a:lvl6pPr marL="2286000" algn="l" defTabSz="457200" rtl="0" eaLnBrk="1" latinLnBrk="0" hangingPunct="1">
+      <a:defRPr sz="1200" kern="1200">
+        <a:solidFill>
+          <a:schemeClr val="tx1"/>
+        </a:solidFill>
+        <a:latin typeface="+mn-lt"/>
+        <a:ea typeface="+mn-ea"/>
+        <a:cs typeface="+mn-cs"/>
+      </a:defRPr>
+    </a:lvl6pPr>
+    <a:lvl7pPr marL="2743200" algn="l" defTabSz="457200" rtl="0" eaLnBrk="1" latinLnBrk="0" hangingPunct="1">
+      <a:defRPr sz="1200" kern="1200">
+        <a:solidFill>
+          <a:schemeClr val="tx1"/>
+        </a:solidFill>
+        <a:latin typeface="+mn-lt"/>
+        <a:ea typeface="+mn-ea"/>
+        <a:cs typeface="+mn-cs"/>
+      </a:defRPr>
+    </a:lvl7pPr>
+    <a:lvl8pPr marL="3200400" algn="l" defTabSz="457200" rtl="0" eaLnBrk="1" latinLnBrk="0" hangingPunct="1">
+      <a:defRPr sz="1200" kern="1200">
+        <a:solidFill>
+          <a:schemeClr val="tx1"/>
+        </a:solidFill>
+        <a:latin typeface="+mn-lt"/>
+        <a:ea typeface="+mn-ea"/>
+        <a:cs typeface="+mn-cs"/>
+      </a:defRPr>
+    </a:lvl8pPr>
+    <a:lvl9pPr marL="3657600" algn="l" defTabSz="457200" rtl="0" eaLnBrk="1" latinLnBrk="0" hangingPunct="1">
+      <a:defRPr sz="1200" kern="1200">
+        <a:solidFill>
+          <a:schemeClr val="tx1"/>
+        </a:solidFill>
+        <a:latin typeface="+mn-lt"/>
+        <a:ea typeface="+mn-ea"/>
+        <a:cs typeface="+mn-cs"/>
+      </a:defRPr>
+    </a:lvl9pPr>
+  </p:notesStyle>
+</p:notesMaster>
+</file>
+
+<file path=ppt/notesSlides/notesSlide1.xml><?xml version="1.0" encoding="utf-8"?>
+<p:notes xmlns:a="http://schemas.openxmlformats.org/drawingml/2006/main" xmlns:r="http://schemas.openxmlformats.org/officeDocument/2006/relationships" xmlns:mc="http://schemas.openxmlformats.org/markup-compatibility/2006" xmlns:mv="urn:schemas-microsoft-com:mac:vml" xmlns:p="http://schemas.openxmlformats.org/presentationml/2006/main" mc:Ignorable="mv" mc:PreserveAttributes="mv:*">
+  <p:cSld>
+    <p:spTree>
+      <p:nvGrpSpPr>
+        <p:cNvPr id="1" name=""/>
+        <p:cNvGrpSpPr/>
+        <p:nvPr/>
+      </p:nvGrpSpPr>
+      <p:grpSpPr>
+        <a:xfrm>
+          <a:off x="0" y="0"/>
+          <a:ext cx="0" cy="0"/>
+          <a:chOff x="0" y="0"/>
+          <a:chExt cx="0" cy="0"/>
+        </a:xfrm>
+      </p:grpSpPr>
+      <p:sp>
+        <p:nvSpPr>
+          <p:cNvPr id="2" name="Slide Image Placeholder 1"/>
+          <p:cNvSpPr>
+            <a:spLocks noGrp="1" noRot="1" noChangeAspect="1"/>
+          </p:cNvSpPr>
+          <p:nvPr>
+            <p:ph type="sldImg"/>
+          </p:nvPr>
+        </p:nvSpPr>
+        <p:spPr/>
+      </p:sp>
+      <p:sp>
+        <p:nvSpPr>
+          <p:cNvPr id="3" name="Notes Placeholder 2"/>
+          <p:cNvSpPr>
+            <a:spLocks noGrp="1"/>
+          </p:cNvSpPr>
+          <p:nvPr>
+            <p:ph type="body" idx="1"/>
+          </p:nvPr>
+        </p:nvSpPr>
+        <p:spPr/>
+        <p:txBody>
+          <a:bodyPr>
+            <a:normAutofit/>
+          </a:bodyPr>
+          <a:lstStyle/>
+          <a:p>
+            <a:r>
+              <a:rPr lang="en-US" dirty="0" smtClean="0"/>
+              <a:t>select </a:t>
+            </a:r>
+            <a:r>
+              <a:rPr lang="en-US" dirty="0" err="1" smtClean="0"/>
+              <a:t>contributor_payee</a:t>
+            </a:r>
+            <a:r>
+              <a:rPr lang="en-US" dirty="0" smtClean="0"/>
+              <a:t>, </a:t>
+            </a:r>
+            <a:r>
+              <a:rPr lang="en-US" dirty="0" err="1" smtClean="0"/>
+              <a:t>sum(amount</a:t>
+            </a:r>
+            <a:r>
+              <a:rPr lang="en-US" dirty="0" smtClean="0"/>
+              <a:t>) from </a:t>
+            </a:r>
+            <a:r>
+              <a:rPr lang="en-US" dirty="0" err="1" smtClean="0"/>
+              <a:t>raw_committee_transactions</a:t>
+            </a:r>
+            <a:r>
+              <a:rPr lang="en-US" dirty="0" smtClean="0"/>
+              <a:t> </a:t>
+            </a:r>
+          </a:p>
+          <a:p>
+            <a:r>
+              <a:rPr lang="en-US" dirty="0" smtClean="0"/>
+              <a:t>where (</a:t>
+            </a:r>
+            <a:r>
+              <a:rPr lang="en-US" dirty="0" err="1" smtClean="0"/>
+              <a:t>contributor_payee</a:t>
+            </a:r>
+            <a:r>
+              <a:rPr lang="en-US" dirty="0" smtClean="0"/>
+              <a:t> like '%$100%’</a:t>
+            </a:r>
+          </a:p>
+          <a:p>
+            <a:r>
+              <a:rPr lang="en-US" dirty="0" smtClean="0"/>
+              <a:t>OR </a:t>
+            </a:r>
+            <a:r>
+              <a:rPr lang="en-US" dirty="0" err="1" smtClean="0"/>
+              <a:t>contributor_payee</a:t>
+            </a:r>
+            <a:r>
+              <a:rPr lang="en-US" dirty="0" smtClean="0"/>
+              <a:t> like '%100.00%’</a:t>
+            </a:r>
+          </a:p>
+          <a:p>
+            <a:r>
+              <a:rPr lang="en-US" dirty="0" smtClean="0"/>
+              <a:t>OR </a:t>
+            </a:r>
+            <a:r>
+              <a:rPr lang="en-US" dirty="0" err="1" smtClean="0"/>
+              <a:t>contributor_payee</a:t>
+            </a:r>
+            <a:r>
+              <a:rPr lang="en-US" dirty="0" smtClean="0"/>
+              <a:t> like '100 dollars’</a:t>
+            </a:r>
+          </a:p>
+          <a:p>
+            <a:r>
+              <a:rPr lang="en-US" dirty="0" smtClean="0"/>
+              <a:t>OR </a:t>
+            </a:r>
+            <a:r>
+              <a:rPr lang="en-US" dirty="0" err="1" smtClean="0"/>
+              <a:t>contributor_payee</a:t>
+            </a:r>
+            <a:r>
+              <a:rPr lang="en-US" dirty="0" smtClean="0"/>
+              <a:t> = 'Under $100')</a:t>
+            </a:r>
+          </a:p>
+          <a:p>
+            <a:r>
+              <a:rPr lang="en-US" dirty="0" smtClean="0"/>
+              <a:t>AND amount &gt; 200</a:t>
+            </a:r>
+          </a:p>
+          <a:p>
+            <a:r>
+              <a:rPr lang="en-US" dirty="0" smtClean="0"/>
+              <a:t>group by </a:t>
+            </a:r>
+            <a:r>
+              <a:rPr lang="en-US" dirty="0" err="1" smtClean="0"/>
+              <a:t>contributor_payee</a:t>
+            </a:r>
+            <a:endParaRPr lang="en-US" dirty="0" smtClean="0"/>
+          </a:p>
+          <a:p>
+            <a:r>
+              <a:rPr lang="en-US" dirty="0" smtClean="0"/>
+              <a:t>order by </a:t>
+            </a:r>
+            <a:r>
+              <a:rPr lang="en-US" dirty="0" err="1" smtClean="0"/>
+              <a:t>sum(amount</a:t>
+            </a:r>
+            <a:r>
+              <a:rPr lang="en-US" dirty="0" smtClean="0"/>
+              <a:t>) </a:t>
+            </a:r>
+            <a:r>
+              <a:rPr lang="en-US" dirty="0" err="1" smtClean="0"/>
+              <a:t>desc</a:t>
+            </a:r>
+            <a:r>
+              <a:rPr lang="en-US" dirty="0" smtClean="0"/>
+              <a:t>;</a:t>
+            </a:r>
+            <a:endParaRPr lang="en-US" dirty="0"/>
+          </a:p>
+        </p:txBody>
+      </p:sp>
+      <p:sp>
+        <p:nvSpPr>
+          <p:cNvPr id="4" name="Slide Number Placeholder 3"/>
+          <p:cNvSpPr>
+            <a:spLocks noGrp="1"/>
+          </p:cNvSpPr>
+          <p:nvPr>
+            <p:ph type="sldNum" sz="quarter" idx="10"/>
+          </p:nvPr>
+        </p:nvSpPr>
+        <p:spPr/>
+        <p:txBody>
+          <a:bodyPr/>
+          <a:lstStyle/>
+          <a:p>
+            <a:fld id="{F0126D94-F4B7-A842-8164-58B78F1F8011}" type="slidenum">
+              <a:rPr lang="en-US" smtClean="0"/>
+              <a:t>12</a:t>
+            </a:fld>
+            <a:endParaRPr lang="en-US"/>
+          </a:p>
+        </p:txBody>
+      </p:sp>
+    </p:spTree>
+  </p:cSld>
+  <p:clrMapOvr>
+    <a:masterClrMapping/>
+  </p:clrMapOvr>
+</p:notes>
 </file>
 
 <file path=ppt/slideLayouts/slideLayout1.xml><?xml version="1.0" encoding="utf-8"?>
@@ -298,7 +855,7 @@
             <a:fld id="{9F85648D-267C-4F54-90B5-C36298A60516}" type="datetimeFigureOut">
               <a:rPr lang="en-US" smtClean="0"/>
               <a:pPr/>
-              <a:t>8/27/14</a:t>
+              <a:t>10/17/14</a:t>
             </a:fld>
             <a:endParaRPr lang="en-US"/>
           </a:p>
@@ -465,7 +1022,7 @@
             <a:fld id="{4B423A71-AA69-784E-A699-F488DB747161}" type="datetimeFigureOut">
               <a:rPr lang="en-US" smtClean="0"/>
               <a:pPr/>
-              <a:t>8/27/14</a:t>
+              <a:t>10/17/14</a:t>
             </a:fld>
             <a:endParaRPr lang="en-US"/>
           </a:p>
@@ -642,7 +1199,7 @@
             <a:fld id="{4B423A71-AA69-784E-A699-F488DB747161}" type="datetimeFigureOut">
               <a:rPr lang="en-US" smtClean="0"/>
               <a:pPr/>
-              <a:t>8/27/14</a:t>
+              <a:t>10/17/14</a:t>
             </a:fld>
             <a:endParaRPr lang="en-US"/>
           </a:p>
@@ -809,7 +1366,7 @@
             <a:fld id="{4B423A71-AA69-784E-A699-F488DB747161}" type="datetimeFigureOut">
               <a:rPr lang="en-US" smtClean="0"/>
               <a:pPr/>
-              <a:t>8/27/14</a:t>
+              <a:t>10/17/14</a:t>
             </a:fld>
             <a:endParaRPr lang="en-US"/>
           </a:p>
@@ -1052,7 +1609,7 @@
             <a:fld id="{E637BB6B-EE1B-48FB-8575-0D55C373DE88}" type="datetimeFigureOut">
               <a:rPr lang="en-US" smtClean="0"/>
               <a:pPr/>
-              <a:t>8/27/14</a:t>
+              <a:t>10/17/14</a:t>
             </a:fld>
             <a:endParaRPr lang="en-US"/>
           </a:p>
@@ -1337,7 +1894,7 @@
             <a:fld id="{4B423A71-AA69-784E-A699-F488DB747161}" type="datetimeFigureOut">
               <a:rPr lang="en-US" smtClean="0"/>
               <a:pPr/>
-              <a:t>8/27/14</a:t>
+              <a:t>10/17/14</a:t>
             </a:fld>
             <a:endParaRPr lang="en-US"/>
           </a:p>
@@ -1756,7 +2313,7 @@
             <a:fld id="{4B423A71-AA69-784E-A699-F488DB747161}" type="datetimeFigureOut">
               <a:rPr lang="en-US" smtClean="0"/>
               <a:pPr/>
-              <a:t>8/27/14</a:t>
+              <a:t>10/17/14</a:t>
             </a:fld>
             <a:endParaRPr lang="en-US"/>
           </a:p>
@@ -1871,7 +2428,7 @@
             <a:fld id="{4B423A71-AA69-784E-A699-F488DB747161}" type="datetimeFigureOut">
               <a:rPr lang="en-US" smtClean="0"/>
               <a:pPr/>
-              <a:t>8/27/14</a:t>
+              <a:t>10/17/14</a:t>
             </a:fld>
             <a:endParaRPr lang="en-US"/>
           </a:p>
@@ -1963,7 +2520,7 @@
             <a:fld id="{4B423A71-AA69-784E-A699-F488DB747161}" type="datetimeFigureOut">
               <a:rPr lang="en-US" smtClean="0"/>
               <a:pPr/>
-              <a:t>8/27/14</a:t>
+              <a:t>10/17/14</a:t>
             </a:fld>
             <a:endParaRPr lang="en-US"/>
           </a:p>
@@ -2237,7 +2794,7 @@
             <a:fld id="{4B423A71-AA69-784E-A699-F488DB747161}" type="datetimeFigureOut">
               <a:rPr lang="en-US" smtClean="0"/>
               <a:pPr/>
-              <a:t>8/27/14</a:t>
+              <a:t>10/17/14</a:t>
             </a:fld>
             <a:endParaRPr lang="en-US"/>
           </a:p>
@@ -2487,7 +3044,7 @@
             <a:fld id="{4B423A71-AA69-784E-A699-F488DB747161}" type="datetimeFigureOut">
               <a:rPr lang="en-US" smtClean="0"/>
               <a:pPr/>
-              <a:t>8/27/14</a:t>
+              <a:t>10/17/14</a:t>
             </a:fld>
             <a:endParaRPr lang="en-US"/>
           </a:p>
@@ -2697,7 +3254,7 @@
             <a:fld id="{4B423A71-AA69-784E-A699-F488DB747161}" type="datetimeFigureOut">
               <a:rPr lang="en-US" smtClean="0"/>
               <a:pPr/>
-              <a:t>8/27/14</a:t>
+              <a:t>10/17/14</a:t>
             </a:fld>
             <a:endParaRPr lang="en-US"/>
           </a:p>
@@ -3603,6 +4160,1194 @@
           </a:graphicData>
         </a:graphic>
       </p:graphicFrame>
+    </p:spTree>
+  </p:cSld>
+  <p:clrMapOvr>
+    <a:masterClrMapping/>
+  </p:clrMapOvr>
+</p:sld>
+</file>
+
+<file path=ppt/slides/slide11.xml><?xml version="1.0" encoding="utf-8"?>
+<p:sld xmlns:a="http://schemas.openxmlformats.org/drawingml/2006/main" xmlns:r="http://schemas.openxmlformats.org/officeDocument/2006/relationships" xmlns:mc="http://schemas.openxmlformats.org/markup-compatibility/2006" xmlns:mv="urn:schemas-microsoft-com:mac:vml" xmlns:p="http://schemas.openxmlformats.org/presentationml/2006/main" mc:Ignorable="mv" mc:PreserveAttributes="mv:*">
+  <p:cSld>
+    <p:spTree>
+      <p:nvGrpSpPr>
+        <p:cNvPr id="1" name=""/>
+        <p:cNvGrpSpPr/>
+        <p:nvPr/>
+      </p:nvGrpSpPr>
+      <p:grpSpPr>
+        <a:xfrm>
+          <a:off x="0" y="0"/>
+          <a:ext cx="0" cy="0"/>
+          <a:chOff x="0" y="0"/>
+          <a:chExt cx="0" cy="0"/>
+        </a:xfrm>
+      </p:grpSpPr>
+      <p:sp>
+        <p:nvSpPr>
+          <p:cNvPr id="2" name="Title 1"/>
+          <p:cNvSpPr>
+            <a:spLocks noGrp="1"/>
+          </p:cNvSpPr>
+          <p:nvPr>
+            <p:ph type="title"/>
+          </p:nvPr>
+        </p:nvSpPr>
+        <p:spPr/>
+        <p:txBody>
+          <a:bodyPr/>
+          <a:lstStyle/>
+          <a:p>
+            <a:r>
+              <a:rPr lang="en-US" dirty="0" smtClean="0"/>
+              <a:t>Grass roots</a:t>
+            </a:r>
+            <a:endParaRPr lang="en-US" dirty="0"/>
+          </a:p>
+        </p:txBody>
+      </p:sp>
+      <p:sp>
+        <p:nvSpPr>
+          <p:cNvPr id="3" name="Content Placeholder 2"/>
+          <p:cNvSpPr>
+            <a:spLocks noGrp="1"/>
+          </p:cNvSpPr>
+          <p:nvPr>
+            <p:ph idx="1"/>
+          </p:nvPr>
+        </p:nvSpPr>
+        <p:spPr/>
+        <p:txBody>
+          <a:bodyPr/>
+          <a:lstStyle/>
+          <a:p>
+            <a:endParaRPr lang="en-US" dirty="0"/>
+          </a:p>
+        </p:txBody>
+      </p:sp>
+    </p:spTree>
+  </p:cSld>
+  <p:clrMapOvr>
+    <a:masterClrMapping/>
+  </p:clrMapOvr>
+</p:sld>
+</file>
+
+<file path=ppt/slides/slide12.xml><?xml version="1.0" encoding="utf-8"?>
+<p:sld xmlns:a="http://schemas.openxmlformats.org/drawingml/2006/main" xmlns:r="http://schemas.openxmlformats.org/officeDocument/2006/relationships" xmlns:mc="http://schemas.openxmlformats.org/markup-compatibility/2006" xmlns:mv="urn:schemas-microsoft-com:mac:vml" xmlns:p="http://schemas.openxmlformats.org/presentationml/2006/main" mc:Ignorable="mv" mc:PreserveAttributes="mv:*">
+  <p:cSld>
+    <p:spTree>
+      <p:nvGrpSpPr>
+        <p:cNvPr id="1" name=""/>
+        <p:cNvGrpSpPr/>
+        <p:nvPr/>
+      </p:nvGrpSpPr>
+      <p:grpSpPr>
+        <a:xfrm>
+          <a:off x="0" y="0"/>
+          <a:ext cx="0" cy="0"/>
+          <a:chOff x="0" y="0"/>
+          <a:chExt cx="0" cy="0"/>
+        </a:xfrm>
+      </p:grpSpPr>
+      <p:sp>
+        <p:nvSpPr>
+          <p:cNvPr id="2" name="Title 1"/>
+          <p:cNvSpPr>
+            <a:spLocks noGrp="1"/>
+          </p:cNvSpPr>
+          <p:nvPr>
+            <p:ph type="title"/>
+          </p:nvPr>
+        </p:nvSpPr>
+        <p:spPr>
+          <a:xfrm>
+            <a:off x="457200" y="-114821"/>
+            <a:ext cx="8229600" cy="1143000"/>
+          </a:xfrm>
+        </p:spPr>
+        <p:txBody>
+          <a:bodyPr>
+            <a:normAutofit fontScale="90000"/>
+          </a:bodyPr>
+          <a:lstStyle/>
+          <a:p>
+            <a:r>
+              <a:rPr lang="en-US" dirty="0" smtClean="0"/>
+              <a:t>Lumped contributions: </a:t>
+            </a:r>
+            <a:br>
+              <a:rPr lang="en-US" dirty="0" smtClean="0"/>
+            </a:br>
+            <a:r>
+              <a:rPr lang="en-US" sz="3111" dirty="0" smtClean="0"/>
+              <a:t>Where the </a:t>
+            </a:r>
+            <a:r>
+              <a:rPr lang="en-US" sz="3111" dirty="0" err="1" smtClean="0"/>
+              <a:t>contibutor_payee</a:t>
+            </a:r>
+            <a:r>
+              <a:rPr lang="en-US" sz="3111" dirty="0" smtClean="0"/>
+              <a:t> includes ‘$100 or less’</a:t>
+            </a:r>
+            <a:endParaRPr lang="en-US" sz="3111" dirty="0"/>
+          </a:p>
+        </p:txBody>
+      </p:sp>
+      <p:graphicFrame>
+        <p:nvGraphicFramePr>
+          <p:cNvPr id="5" name="Table 4"/>
+          <p:cNvGraphicFramePr>
+            <a:graphicFrameLocks noGrp="1"/>
+          </p:cNvGraphicFramePr>
+          <p:nvPr/>
+        </p:nvGraphicFramePr>
+        <p:xfrm>
+          <a:off x="287861" y="1078978"/>
+          <a:ext cx="3640670" cy="4725769"/>
+        </p:xfrm>
+        <a:graphic>
+          <a:graphicData uri="http://schemas.openxmlformats.org/drawingml/2006/table">
+            <a:tbl>
+              <a:tblPr firstRow="1" bandRow="1">
+                <a:tableStyleId>{5C22544A-7EE6-4342-B048-85BDC9FD1C3A}</a:tableStyleId>
+              </a:tblPr>
+              <a:tblGrid>
+                <a:gridCol w="2421469"/>
+                <a:gridCol w="1219201"/>
+              </a:tblGrid>
+              <a:tr h="275689">
+                <a:tc>
+                  <a:txBody>
+                    <a:bodyPr/>
+                    <a:lstStyle/>
+                    <a:p>
+                      <a:pPr algn="ctr" fontAlgn="b"/>
+                      <a:r>
+                        <a:rPr lang="en-US" sz="1200" b="0" i="0" u="none" strike="noStrike" dirty="0" err="1">
+                          <a:latin typeface="Verdana"/>
+                        </a:rPr>
+                        <a:t>contributor_payee</a:t>
+                      </a:r>
+                      <a:endParaRPr lang="en-US" sz="1200" b="0" i="0" u="none" strike="noStrike" dirty="0">
+                        <a:latin typeface="Verdana"/>
+                      </a:endParaRPr>
+                    </a:p>
+                  </a:txBody>
+                  <a:tcPr marL="12700" marR="12700" marT="12700" marB="0" anchor="ctr"/>
+                </a:tc>
+                <a:tc>
+                  <a:txBody>
+                    <a:bodyPr/>
+                    <a:lstStyle/>
+                    <a:p>
+                      <a:pPr algn="ctr" fontAlgn="b"/>
+                      <a:r>
+                        <a:rPr lang="en-US" sz="1200" b="0" i="0" u="none" strike="noStrike" dirty="0" err="1">
+                          <a:latin typeface="Verdana"/>
+                        </a:rPr>
+                        <a:t>sum(amount</a:t>
+                      </a:r>
+                      <a:r>
+                        <a:rPr lang="en-US" sz="1200" b="0" i="0" u="none" strike="noStrike" dirty="0">
+                          <a:latin typeface="Verdana"/>
+                        </a:rPr>
+                        <a:t>)</a:t>
+                      </a:r>
+                    </a:p>
+                  </a:txBody>
+                  <a:tcPr marL="12700" marR="12700" marT="12700" marB="0" anchor="ctr"/>
+                </a:tc>
+              </a:tr>
+              <a:tr h="370840">
+                <a:tc>
+                  <a:txBody>
+                    <a:bodyPr/>
+                    <a:lstStyle/>
+                    <a:p>
+                      <a:pPr algn="l" fontAlgn="b"/>
+                      <a:r>
+                        <a:rPr lang="en-US" sz="1100" b="1" i="0" u="none" strike="noStrike">
+                          <a:latin typeface="Verdana"/>
+                        </a:rPr>
+                        <a:t>Miscellaneous Cash Contributions $100 and under </a:t>
+                      </a:r>
+                    </a:p>
+                  </a:txBody>
+                  <a:tcPr marL="12700" marR="12700" marT="12700" marB="0" anchor="b"/>
+                </a:tc>
+                <a:tc>
+                  <a:txBody>
+                    <a:bodyPr/>
+                    <a:lstStyle/>
+                    <a:p>
+                      <a:pPr algn="r" fontAlgn="b"/>
+                      <a:r>
+                        <a:rPr lang="en-US" sz="1000" b="0" i="0" u="none" strike="noStrike">
+                          <a:latin typeface="Verdana"/>
+                        </a:rPr>
+                        <a:t>$34,679,106.62</a:t>
+                      </a:r>
+                    </a:p>
+                  </a:txBody>
+                  <a:tcPr marL="12700" marR="12700" marT="12700" marB="0" anchor="b"/>
+                </a:tc>
+              </a:tr>
+              <a:tr h="370840">
+                <a:tc>
+                  <a:txBody>
+                    <a:bodyPr/>
+                    <a:lstStyle/>
+                    <a:p>
+                      <a:pPr algn="l" fontAlgn="b"/>
+                      <a:r>
+                        <a:rPr lang="en-US" sz="1100" b="1" i="0" u="none" strike="noStrike">
+                          <a:latin typeface="Verdana"/>
+                        </a:rPr>
+                        <a:t>Miscellaneous Pledges of Cash $100 and under</a:t>
+                      </a:r>
+                    </a:p>
+                  </a:txBody>
+                  <a:tcPr marL="12700" marR="12700" marT="12700" marB="0" anchor="b"/>
+                </a:tc>
+                <a:tc>
+                  <a:txBody>
+                    <a:bodyPr/>
+                    <a:lstStyle/>
+                    <a:p>
+                      <a:pPr algn="r" fontAlgn="b"/>
+                      <a:r>
+                        <a:rPr lang="en-US" sz="1000" b="0" i="0" u="none" strike="noStrike">
+                          <a:latin typeface="Verdana"/>
+                        </a:rPr>
+                        <a:t>$663,950.53</a:t>
+                      </a:r>
+                    </a:p>
+                  </a:txBody>
+                  <a:tcPr marL="12700" marR="12700" marT="12700" marB="0" anchor="b"/>
+                </a:tc>
+              </a:tr>
+              <a:tr h="370840">
+                <a:tc>
+                  <a:txBody>
+                    <a:bodyPr/>
+                    <a:lstStyle/>
+                    <a:p>
+                      <a:pPr algn="l" fontAlgn="b"/>
+                      <a:r>
+                        <a:rPr lang="en-US" sz="1100" b="1" i="0" u="none" strike="noStrike">
+                          <a:latin typeface="Verdana"/>
+                        </a:rPr>
+                        <a:t>Miscellaneous cash contributions $100 and under</a:t>
+                      </a:r>
+                    </a:p>
+                  </a:txBody>
+                  <a:tcPr marL="12700" marR="12700" marT="12700" marB="0" anchor="b"/>
+                </a:tc>
+                <a:tc>
+                  <a:txBody>
+                    <a:bodyPr/>
+                    <a:lstStyle/>
+                    <a:p>
+                      <a:pPr algn="r" fontAlgn="b"/>
+                      <a:r>
+                        <a:rPr lang="en-US" sz="1000" b="0" i="0" u="none" strike="noStrike">
+                          <a:latin typeface="Verdana"/>
+                        </a:rPr>
+                        <a:t>$589,414.30</a:t>
+                      </a:r>
+                    </a:p>
+                  </a:txBody>
+                  <a:tcPr marL="12700" marR="12700" marT="12700" marB="0" anchor="b"/>
+                </a:tc>
+              </a:tr>
+              <a:tr h="370840">
+                <a:tc>
+                  <a:txBody>
+                    <a:bodyPr/>
+                    <a:lstStyle/>
+                    <a:p>
+                      <a:pPr algn="l" fontAlgn="b"/>
+                      <a:r>
+                        <a:rPr lang="en-US" sz="1100" b="1" i="0" u="none" strike="noStrike">
+                          <a:latin typeface="Verdana"/>
+                        </a:rPr>
+                        <a:t>Miscellaneous contributions of $100 and under</a:t>
+                      </a:r>
+                    </a:p>
+                  </a:txBody>
+                  <a:tcPr marL="12700" marR="12700" marT="12700" marB="0" anchor="b"/>
+                </a:tc>
+                <a:tc>
+                  <a:txBody>
+                    <a:bodyPr/>
+                    <a:lstStyle/>
+                    <a:p>
+                      <a:pPr algn="r" fontAlgn="b"/>
+                      <a:r>
+                        <a:rPr lang="en-US" sz="1000" b="0" i="0" u="none" strike="noStrike">
+                          <a:latin typeface="Verdana"/>
+                        </a:rPr>
+                        <a:t>$401,154.71</a:t>
+                      </a:r>
+                    </a:p>
+                  </a:txBody>
+                  <a:tcPr marL="12700" marR="12700" marT="12700" marB="0" anchor="b"/>
+                </a:tc>
+              </a:tr>
+              <a:tr h="370840">
+                <a:tc>
+                  <a:txBody>
+                    <a:bodyPr/>
+                    <a:lstStyle/>
+                    <a:p>
+                      <a:pPr algn="l" fontAlgn="b"/>
+                      <a:r>
+                        <a:rPr lang="en-US" sz="1100" b="1" i="0" u="none" strike="noStrike">
+                          <a:latin typeface="Verdana"/>
+                        </a:rPr>
+                        <a:t>Miscellaneous contributions $100 and under</a:t>
+                      </a:r>
+                    </a:p>
+                  </a:txBody>
+                  <a:tcPr marL="12700" marR="12700" marT="12700" marB="0" anchor="b"/>
+                </a:tc>
+                <a:tc>
+                  <a:txBody>
+                    <a:bodyPr/>
+                    <a:lstStyle/>
+                    <a:p>
+                      <a:pPr algn="r" fontAlgn="b"/>
+                      <a:r>
+                        <a:rPr lang="en-US" sz="1000" b="0" i="0" u="none" strike="noStrike">
+                          <a:latin typeface="Verdana"/>
+                        </a:rPr>
+                        <a:t>$238,657.54</a:t>
+                      </a:r>
+                    </a:p>
+                  </a:txBody>
+                  <a:tcPr marL="12700" marR="12700" marT="12700" marB="0" anchor="b"/>
+                </a:tc>
+              </a:tr>
+              <a:tr h="370840">
+                <a:tc>
+                  <a:txBody>
+                    <a:bodyPr/>
+                    <a:lstStyle/>
+                    <a:p>
+                      <a:pPr algn="l" fontAlgn="b"/>
+                      <a:r>
+                        <a:rPr lang="en-US" sz="1100" b="1" i="0" u="none" strike="noStrike">
+                          <a:latin typeface="Verdana"/>
+                        </a:rPr>
+                        <a:t>Miscellaneous In-Kind Contributions $100 and under</a:t>
+                      </a:r>
+                    </a:p>
+                  </a:txBody>
+                  <a:tcPr marL="12700" marR="12700" marT="12700" marB="0" anchor="b"/>
+                </a:tc>
+                <a:tc>
+                  <a:txBody>
+                    <a:bodyPr/>
+                    <a:lstStyle/>
+                    <a:p>
+                      <a:pPr algn="r" fontAlgn="b"/>
+                      <a:r>
+                        <a:rPr lang="en-US" sz="1000" b="0" i="0" u="none" strike="noStrike">
+                          <a:latin typeface="Verdana"/>
+                        </a:rPr>
+                        <a:t>$182,869.79</a:t>
+                      </a:r>
+                    </a:p>
+                  </a:txBody>
+                  <a:tcPr marL="12700" marR="12700" marT="12700" marB="0" anchor="b"/>
+                </a:tc>
+              </a:tr>
+              <a:tr h="370840">
+                <a:tc>
+                  <a:txBody>
+                    <a:bodyPr/>
+                    <a:lstStyle/>
+                    <a:p>
+                      <a:pPr algn="l" fontAlgn="b"/>
+                      <a:r>
+                        <a:rPr lang="en-US" sz="1100" b="1" i="0" u="none" strike="noStrike">
+                          <a:latin typeface="Verdana"/>
+                        </a:rPr>
+                        <a:t>Misc contributions $100 and under</a:t>
+                      </a:r>
+                    </a:p>
+                  </a:txBody>
+                  <a:tcPr marL="12700" marR="12700" marT="12700" marB="0" anchor="b"/>
+                </a:tc>
+                <a:tc>
+                  <a:txBody>
+                    <a:bodyPr/>
+                    <a:lstStyle/>
+                    <a:p>
+                      <a:pPr algn="r" fontAlgn="b"/>
+                      <a:r>
+                        <a:rPr lang="en-US" sz="1000" b="0" i="0" u="none" strike="noStrike">
+                          <a:latin typeface="Verdana"/>
+                        </a:rPr>
+                        <a:t>$145,116.00</a:t>
+                      </a:r>
+                    </a:p>
+                  </a:txBody>
+                  <a:tcPr marL="12700" marR="12700" marT="12700" marB="0" anchor="b"/>
+                </a:tc>
+              </a:tr>
+              <a:tr h="370840">
+                <a:tc>
+                  <a:txBody>
+                    <a:bodyPr/>
+                    <a:lstStyle/>
+                    <a:p>
+                      <a:pPr algn="l" fontAlgn="b"/>
+                      <a:r>
+                        <a:rPr lang="en-US" sz="1100" b="0" i="0" u="none" strike="noStrike" dirty="0">
+                          <a:latin typeface="Verdana"/>
+                        </a:rPr>
+                        <a:t>Miscellaneous Cash Expenditures $100 and under</a:t>
+                      </a:r>
+                    </a:p>
+                  </a:txBody>
+                  <a:tcPr marL="12700" marR="12700" marT="12700" marB="0" anchor="b"/>
+                </a:tc>
+                <a:tc>
+                  <a:txBody>
+                    <a:bodyPr/>
+                    <a:lstStyle/>
+                    <a:p>
+                      <a:pPr algn="r" fontAlgn="b"/>
+                      <a:r>
+                        <a:rPr lang="en-US" sz="1000" b="0" i="0" u="none" strike="noStrike">
+                          <a:latin typeface="Verdana"/>
+                        </a:rPr>
+                        <a:t>$130,738.27</a:t>
+                      </a:r>
+                    </a:p>
+                  </a:txBody>
+                  <a:tcPr marL="12700" marR="12700" marT="12700" marB="0" anchor="b"/>
+                </a:tc>
+              </a:tr>
+              <a:tr h="370840">
+                <a:tc>
+                  <a:txBody>
+                    <a:bodyPr/>
+                    <a:lstStyle/>
+                    <a:p>
+                      <a:pPr algn="l" fontAlgn="b"/>
+                      <a:r>
+                        <a:rPr lang="en-US" sz="1100" b="1" i="0" u="none" strike="noStrike">
+                          <a:latin typeface="Verdana"/>
+                        </a:rPr>
+                        <a:t>Miscellaneous Contributions $100 and under</a:t>
+                      </a:r>
+                    </a:p>
+                  </a:txBody>
+                  <a:tcPr marL="12700" marR="12700" marT="12700" marB="0" anchor="b"/>
+                </a:tc>
+                <a:tc>
+                  <a:txBody>
+                    <a:bodyPr/>
+                    <a:lstStyle/>
+                    <a:p>
+                      <a:pPr algn="r" fontAlgn="b"/>
+                      <a:r>
+                        <a:rPr lang="en-US" sz="1000" b="0" i="0" u="none" strike="noStrike">
+                          <a:latin typeface="Verdana"/>
+                        </a:rPr>
+                        <a:t>$93,835.05</a:t>
+                      </a:r>
+                    </a:p>
+                  </a:txBody>
+                  <a:tcPr marL="12700" marR="12700" marT="12700" marB="0" anchor="b"/>
+                </a:tc>
+              </a:tr>
+              <a:tr h="370840">
+                <a:tc>
+                  <a:txBody>
+                    <a:bodyPr/>
+                    <a:lstStyle/>
+                    <a:p>
+                      <a:pPr algn="l" fontAlgn="b"/>
+                      <a:r>
+                        <a:rPr lang="en-US" sz="1100" b="0" i="0" u="none" strike="noStrike">
+                          <a:latin typeface="Verdana"/>
+                        </a:rPr>
+                        <a:t>Miscellaneous Uncollectible Pledges of Cash $100 and under</a:t>
+                      </a:r>
+                    </a:p>
+                  </a:txBody>
+                  <a:tcPr marL="12700" marR="12700" marT="12700" marB="0" anchor="b"/>
+                </a:tc>
+                <a:tc>
+                  <a:txBody>
+                    <a:bodyPr/>
+                    <a:lstStyle/>
+                    <a:p>
+                      <a:pPr algn="r" fontAlgn="b"/>
+                      <a:r>
+                        <a:rPr lang="en-US" sz="1000" b="0" i="0" u="none" strike="noStrike">
+                          <a:latin typeface="Verdana"/>
+                        </a:rPr>
+                        <a:t>$31,687.00</a:t>
+                      </a:r>
+                    </a:p>
+                  </a:txBody>
+                  <a:tcPr marL="12700" marR="12700" marT="12700" marB="0" anchor="b"/>
+                </a:tc>
+              </a:tr>
+              <a:tr h="370840">
+                <a:tc>
+                  <a:txBody>
+                    <a:bodyPr/>
+                    <a:lstStyle/>
+                    <a:p>
+                      <a:pPr algn="l" fontAlgn="b"/>
+                      <a:r>
+                        <a:rPr lang="en-US" sz="1100" b="0" i="0" u="none" strike="noStrike">
+                          <a:latin typeface="Verdana"/>
+                        </a:rPr>
+                        <a:t>Miscellaneous Return/Refund of Contribution $100 and under</a:t>
+                      </a:r>
+                    </a:p>
+                  </a:txBody>
+                  <a:tcPr marL="12700" marR="12700" marT="12700" marB="0" anchor="b"/>
+                </a:tc>
+                <a:tc>
+                  <a:txBody>
+                    <a:bodyPr/>
+                    <a:lstStyle/>
+                    <a:p>
+                      <a:pPr algn="r" fontAlgn="b"/>
+                      <a:r>
+                        <a:rPr lang="en-US" sz="1000" b="0" i="0" u="none" strike="noStrike">
+                          <a:latin typeface="Verdana"/>
+                        </a:rPr>
+                        <a:t>$19,394.00</a:t>
+                      </a:r>
+                    </a:p>
+                  </a:txBody>
+                  <a:tcPr marL="12700" marR="12700" marT="12700" marB="0" anchor="b"/>
+                </a:tc>
+              </a:tr>
+              <a:tr h="370840">
+                <a:tc>
+                  <a:txBody>
+                    <a:bodyPr/>
+                    <a:lstStyle/>
+                    <a:p>
+                      <a:pPr algn="l" fontAlgn="b"/>
+                      <a:r>
+                        <a:rPr lang="en-US" sz="1100" b="0" i="0" u="none" strike="noStrike" dirty="0">
+                          <a:latin typeface="Verdana"/>
+                        </a:rPr>
+                        <a:t>Miscellaneous Personal Expenditures $100 and under</a:t>
+                      </a:r>
+                    </a:p>
+                  </a:txBody>
+                  <a:tcPr marL="12700" marR="12700" marT="12700" marB="0" anchor="b"/>
+                </a:tc>
+                <a:tc>
+                  <a:txBody>
+                    <a:bodyPr/>
+                    <a:lstStyle/>
+                    <a:p>
+                      <a:pPr algn="r" fontAlgn="b"/>
+                      <a:r>
+                        <a:rPr lang="en-US" sz="1000" b="0" i="0" u="none" strike="noStrike" dirty="0">
+                          <a:latin typeface="Verdana"/>
+                        </a:rPr>
+                        <a:t>$14,624.84</a:t>
+                      </a:r>
+                    </a:p>
+                  </a:txBody>
+                  <a:tcPr marL="12700" marR="12700" marT="12700" marB="0" anchor="b"/>
+                </a:tc>
+              </a:tr>
+            </a:tbl>
+          </a:graphicData>
+        </a:graphic>
+      </p:graphicFrame>
+      <p:graphicFrame>
+        <p:nvGraphicFramePr>
+          <p:cNvPr id="6" name="Table 5"/>
+          <p:cNvGraphicFramePr>
+            <a:graphicFrameLocks noGrp="1"/>
+          </p:cNvGraphicFramePr>
+          <p:nvPr/>
+        </p:nvGraphicFramePr>
+        <p:xfrm>
+          <a:off x="4301082" y="1102365"/>
+          <a:ext cx="4453467" cy="5191760"/>
+        </p:xfrm>
+        <a:graphic>
+          <a:graphicData uri="http://schemas.openxmlformats.org/drawingml/2006/table">
+            <a:tbl>
+              <a:tblPr firstRow="1" bandRow="1">
+                <a:tableStyleId>{5C22544A-7EE6-4342-B048-85BDC9FD1C3A}</a:tableStyleId>
+              </a:tblPr>
+              <a:tblGrid>
+                <a:gridCol w="3251192"/>
+                <a:gridCol w="1202275"/>
+              </a:tblGrid>
+              <a:tr h="370840">
+                <a:tc>
+                  <a:txBody>
+                    <a:bodyPr/>
+                    <a:lstStyle/>
+                    <a:p>
+                      <a:pPr algn="ctr" fontAlgn="b"/>
+                      <a:r>
+                        <a:rPr lang="en-US" sz="1200" b="0" i="0" u="none" strike="noStrike" dirty="0" err="1">
+                          <a:latin typeface="Verdana"/>
+                        </a:rPr>
+                        <a:t>contributor_payee</a:t>
+                      </a:r>
+                      <a:endParaRPr lang="en-US" sz="1200" b="0" i="0" u="none" strike="noStrike" dirty="0">
+                        <a:latin typeface="Verdana"/>
+                      </a:endParaRPr>
+                    </a:p>
+                  </a:txBody>
+                  <a:tcPr marL="12700" marR="12700" marT="12700" marB="0" anchor="ctr"/>
+                </a:tc>
+                <a:tc>
+                  <a:txBody>
+                    <a:bodyPr/>
+                    <a:lstStyle/>
+                    <a:p>
+                      <a:pPr algn="ctr" fontAlgn="b"/>
+                      <a:r>
+                        <a:rPr lang="en-US" sz="1200" b="0" i="0" u="none" strike="noStrike" dirty="0" err="1">
+                          <a:latin typeface="Verdana"/>
+                        </a:rPr>
+                        <a:t>sum(amount</a:t>
+                      </a:r>
+                      <a:r>
+                        <a:rPr lang="en-US" sz="1200" b="0" i="0" u="none" strike="noStrike" dirty="0">
+                          <a:latin typeface="Verdana"/>
+                        </a:rPr>
+                        <a:t>)</a:t>
+                      </a:r>
+                    </a:p>
+                  </a:txBody>
+                  <a:tcPr marL="12700" marR="12700" marT="12700" marB="0" anchor="ctr"/>
+                </a:tc>
+              </a:tr>
+              <a:tr h="370840">
+                <a:tc>
+                  <a:txBody>
+                    <a:bodyPr/>
+                    <a:lstStyle/>
+                    <a:p>
+                      <a:pPr algn="l" fontAlgn="b"/>
+                      <a:r>
+                        <a:rPr lang="en-US" sz="1100" b="1" i="0" u="none" strike="noStrike" dirty="0">
+                          <a:latin typeface="Verdana"/>
+                        </a:rPr>
+                        <a:t>Miscellaneous Cash Contributions $100 and under</a:t>
+                      </a:r>
+                    </a:p>
+                  </a:txBody>
+                  <a:tcPr marL="12700" marR="12700" marT="12700" marB="0" anchor="b"/>
+                </a:tc>
+                <a:tc>
+                  <a:txBody>
+                    <a:bodyPr/>
+                    <a:lstStyle/>
+                    <a:p>
+                      <a:pPr algn="r" fontAlgn="b"/>
+                      <a:r>
+                        <a:rPr lang="en-US" sz="1000" b="0" i="0" u="none" strike="noStrike">
+                          <a:latin typeface="Verdana"/>
+                        </a:rPr>
+                        <a:t>$14,380.00</a:t>
+                      </a:r>
+                    </a:p>
+                  </a:txBody>
+                  <a:tcPr marL="12700" marR="12700" marT="12700" marB="0" anchor="b"/>
+                </a:tc>
+              </a:tr>
+              <a:tr h="370840">
+                <a:tc>
+                  <a:txBody>
+                    <a:bodyPr/>
+                    <a:lstStyle/>
+                    <a:p>
+                      <a:pPr algn="l" fontAlgn="b"/>
+                      <a:r>
+                        <a:rPr lang="en-US" sz="1100" b="1" i="0" u="none" strike="noStrike" dirty="0">
+                          <a:latin typeface="Verdana"/>
+                        </a:rPr>
+                        <a:t>Misc. Contributions Under $100</a:t>
+                      </a:r>
+                    </a:p>
+                  </a:txBody>
+                  <a:tcPr marL="12700" marR="12700" marT="12700" marB="0" anchor="b"/>
+                </a:tc>
+                <a:tc>
+                  <a:txBody>
+                    <a:bodyPr/>
+                    <a:lstStyle/>
+                    <a:p>
+                      <a:pPr algn="r" fontAlgn="b"/>
+                      <a:r>
+                        <a:rPr lang="en-US" sz="1000" b="0" i="0" u="none" strike="noStrike">
+                          <a:latin typeface="Verdana"/>
+                        </a:rPr>
+                        <a:t>$8,198.03</a:t>
+                      </a:r>
+                    </a:p>
+                  </a:txBody>
+                  <a:tcPr marL="12700" marR="12700" marT="12700" marB="0" anchor="b"/>
+                </a:tc>
+              </a:tr>
+              <a:tr h="370840">
+                <a:tc>
+                  <a:txBody>
+                    <a:bodyPr/>
+                    <a:lstStyle/>
+                    <a:p>
+                      <a:pPr algn="l" fontAlgn="b"/>
+                      <a:r>
+                        <a:rPr lang="en-US" sz="1100" b="1" i="0" u="none" strike="noStrike">
+                          <a:latin typeface="Verdana"/>
+                        </a:rPr>
+                        <a:t>Contributors Under $100.00 Agregate</a:t>
+                      </a:r>
+                    </a:p>
+                  </a:txBody>
+                  <a:tcPr marL="12700" marR="12700" marT="12700" marB="0" anchor="b"/>
+                </a:tc>
+                <a:tc>
+                  <a:txBody>
+                    <a:bodyPr/>
+                    <a:lstStyle/>
+                    <a:p>
+                      <a:pPr algn="r" fontAlgn="b"/>
+                      <a:r>
+                        <a:rPr lang="en-US" sz="1000" b="0" i="0" u="none" strike="noStrike">
+                          <a:latin typeface="Verdana"/>
+                        </a:rPr>
+                        <a:t>$4,856.65</a:t>
+                      </a:r>
+                    </a:p>
+                  </a:txBody>
+                  <a:tcPr marL="12700" marR="12700" marT="12700" marB="0" anchor="b"/>
+                </a:tc>
+              </a:tr>
+              <a:tr h="370840">
+                <a:tc>
+                  <a:txBody>
+                    <a:bodyPr/>
+                    <a:lstStyle/>
+                    <a:p>
+                      <a:pPr algn="l" fontAlgn="b"/>
+                      <a:r>
+                        <a:rPr lang="en-US" sz="1100" b="1" i="0" u="none" strike="noStrike">
+                          <a:latin typeface="Verdana"/>
+                        </a:rPr>
+                        <a:t>Misc Contributions $100 or less, Fire Fighter</a:t>
+                      </a:r>
+                    </a:p>
+                  </a:txBody>
+                  <a:tcPr marL="12700" marR="12700" marT="12700" marB="0" anchor="b"/>
+                </a:tc>
+                <a:tc>
+                  <a:txBody>
+                    <a:bodyPr/>
+                    <a:lstStyle/>
+                    <a:p>
+                      <a:pPr algn="r" fontAlgn="b"/>
+                      <a:r>
+                        <a:rPr lang="en-US" sz="1000" b="0" i="0" u="none" strike="noStrike">
+                          <a:latin typeface="Verdana"/>
+                        </a:rPr>
+                        <a:t>$3,472.66</a:t>
+                      </a:r>
+                    </a:p>
+                  </a:txBody>
+                  <a:tcPr marL="12700" marR="12700" marT="12700" marB="0" anchor="b"/>
+                </a:tc>
+              </a:tr>
+              <a:tr h="370840">
+                <a:tc>
+                  <a:txBody>
+                    <a:bodyPr/>
+                    <a:lstStyle/>
+                    <a:p>
+                      <a:pPr algn="l" fontAlgn="b"/>
+                      <a:r>
+                        <a:rPr lang="en-US" sz="1100" b="1" i="0" u="none" strike="noStrike">
+                          <a:latin typeface="Verdana"/>
+                        </a:rPr>
+                        <a:t>miscellaneous cash contribution of $100 or less</a:t>
+                      </a:r>
+                    </a:p>
+                  </a:txBody>
+                  <a:tcPr marL="12700" marR="12700" marT="12700" marB="0" anchor="b"/>
+                </a:tc>
+                <a:tc>
+                  <a:txBody>
+                    <a:bodyPr/>
+                    <a:lstStyle/>
+                    <a:p>
+                      <a:pPr algn="r" fontAlgn="b"/>
+                      <a:r>
+                        <a:rPr lang="en-US" sz="1000" b="0" i="0" u="none" strike="noStrike">
+                          <a:latin typeface="Verdana"/>
+                        </a:rPr>
+                        <a:t>$1,850.00</a:t>
+                      </a:r>
+                    </a:p>
+                  </a:txBody>
+                  <a:tcPr marL="12700" marR="12700" marT="12700" marB="0" anchor="b"/>
+                </a:tc>
+              </a:tr>
+              <a:tr h="370840">
+                <a:tc>
+                  <a:txBody>
+                    <a:bodyPr/>
+                    <a:lstStyle/>
+                    <a:p>
+                      <a:pPr algn="l" fontAlgn="b"/>
+                      <a:r>
+                        <a:rPr lang="en-US" sz="1100" b="1" i="0" u="none" strike="noStrike">
+                          <a:latin typeface="Verdana"/>
+                        </a:rPr>
+                        <a:t>MISCELLANEOUS CONTRIBUTIONS 100.00 OR LESS</a:t>
+                      </a:r>
+                    </a:p>
+                  </a:txBody>
+                  <a:tcPr marL="12700" marR="12700" marT="12700" marB="0" anchor="b"/>
+                </a:tc>
+                <a:tc>
+                  <a:txBody>
+                    <a:bodyPr/>
+                    <a:lstStyle/>
+                    <a:p>
+                      <a:pPr algn="r" fontAlgn="b"/>
+                      <a:r>
+                        <a:rPr lang="en-US" sz="1000" b="0" i="0" u="none" strike="noStrike">
+                          <a:latin typeface="Verdana"/>
+                        </a:rPr>
+                        <a:t>$1,799.00</a:t>
+                      </a:r>
+                    </a:p>
+                  </a:txBody>
+                  <a:tcPr marL="12700" marR="12700" marT="12700" marB="0" anchor="b"/>
+                </a:tc>
+              </a:tr>
+              <a:tr h="370840">
+                <a:tc>
+                  <a:txBody>
+                    <a:bodyPr/>
+                    <a:lstStyle/>
+                    <a:p>
+                      <a:pPr algn="l" fontAlgn="b"/>
+                      <a:r>
+                        <a:rPr lang="en-US" sz="1100" b="1" i="0" u="none" strike="noStrike">
+                          <a:latin typeface="Verdana"/>
+                        </a:rPr>
+                        <a:t>Miscellaneous Cash Contributions $100 and Under</a:t>
+                      </a:r>
+                    </a:p>
+                  </a:txBody>
+                  <a:tcPr marL="12700" marR="12700" marT="12700" marB="0" anchor="b"/>
+                </a:tc>
+                <a:tc>
+                  <a:txBody>
+                    <a:bodyPr/>
+                    <a:lstStyle/>
+                    <a:p>
+                      <a:pPr algn="r" fontAlgn="b"/>
+                      <a:r>
+                        <a:rPr lang="en-US" sz="1000" b="0" i="0" u="none" strike="noStrike">
+                          <a:latin typeface="Verdana"/>
+                        </a:rPr>
+                        <a:t>$783.00</a:t>
+                      </a:r>
+                    </a:p>
+                  </a:txBody>
+                  <a:tcPr marL="12700" marR="12700" marT="12700" marB="0" anchor="b"/>
+                </a:tc>
+              </a:tr>
+              <a:tr h="370840">
+                <a:tc>
+                  <a:txBody>
+                    <a:bodyPr/>
+                    <a:lstStyle/>
+                    <a:p>
+                      <a:pPr algn="l" fontAlgn="b"/>
+                      <a:r>
+                        <a:rPr lang="en-US" sz="1100" b="0" i="0" u="none" strike="noStrike">
+                          <a:latin typeface="Verdana"/>
+                        </a:rPr>
+                        <a:t>Refunds Of Miscellaneous Contributions $100 or Less</a:t>
+                      </a:r>
+                    </a:p>
+                  </a:txBody>
+                  <a:tcPr marL="12700" marR="12700" marT="12700" marB="0" anchor="b"/>
+                </a:tc>
+                <a:tc>
+                  <a:txBody>
+                    <a:bodyPr/>
+                    <a:lstStyle/>
+                    <a:p>
+                      <a:pPr algn="r" fontAlgn="b"/>
+                      <a:r>
+                        <a:rPr lang="en-US" sz="1000" b="0" i="0" u="none" strike="noStrike">
+                          <a:latin typeface="Verdana"/>
+                        </a:rPr>
+                        <a:t>$700.00</a:t>
+                      </a:r>
+                    </a:p>
+                  </a:txBody>
+                  <a:tcPr marL="12700" marR="12700" marT="12700" marB="0" anchor="b"/>
+                </a:tc>
+              </a:tr>
+              <a:tr h="370840">
+                <a:tc>
+                  <a:txBody>
+                    <a:bodyPr/>
+                    <a:lstStyle/>
+                    <a:p>
+                      <a:pPr algn="l" fontAlgn="b"/>
+                      <a:r>
+                        <a:rPr lang="en-US" sz="1100" b="1" i="0" u="none" strike="noStrike">
+                          <a:latin typeface="Verdana"/>
+                        </a:rPr>
+                        <a:t>Miscellaneous Cas Contributions $100 &amp; Under</a:t>
+                      </a:r>
+                    </a:p>
+                  </a:txBody>
+                  <a:tcPr marL="12700" marR="12700" marT="12700" marB="0" anchor="b"/>
+                </a:tc>
+                <a:tc>
+                  <a:txBody>
+                    <a:bodyPr/>
+                    <a:lstStyle/>
+                    <a:p>
+                      <a:pPr algn="r" fontAlgn="b"/>
+                      <a:r>
+                        <a:rPr lang="en-US" sz="1000" b="0" i="0" u="none" strike="noStrike">
+                          <a:latin typeface="Verdana"/>
+                        </a:rPr>
+                        <a:t>$612.00</a:t>
+                      </a:r>
+                    </a:p>
+                  </a:txBody>
+                  <a:tcPr marL="12700" marR="12700" marT="12700" marB="0" anchor="b"/>
+                </a:tc>
+              </a:tr>
+              <a:tr h="370840">
+                <a:tc>
+                  <a:txBody>
+                    <a:bodyPr/>
+                    <a:lstStyle/>
+                    <a:p>
+                      <a:pPr algn="l" fontAlgn="b"/>
+                      <a:r>
+                        <a:rPr lang="en-US" sz="1100" b="1" i="0" u="none" strike="noStrike">
+                          <a:latin typeface="Verdana"/>
+                        </a:rPr>
+                        <a:t>Miscellaneous contributions of $100 or less</a:t>
+                      </a:r>
+                    </a:p>
+                  </a:txBody>
+                  <a:tcPr marL="12700" marR="12700" marT="12700" marB="0" anchor="b"/>
+                </a:tc>
+                <a:tc>
+                  <a:txBody>
+                    <a:bodyPr/>
+                    <a:lstStyle/>
+                    <a:p>
+                      <a:pPr algn="r" fontAlgn="b"/>
+                      <a:r>
+                        <a:rPr lang="en-US" sz="1000" b="0" i="0" u="none" strike="noStrike">
+                          <a:latin typeface="Verdana"/>
+                        </a:rPr>
+                        <a:t>$495.00</a:t>
+                      </a:r>
+                    </a:p>
+                  </a:txBody>
+                  <a:tcPr marL="12700" marR="12700" marT="12700" marB="0" anchor="b"/>
+                </a:tc>
+              </a:tr>
+              <a:tr h="370840">
+                <a:tc>
+                  <a:txBody>
+                    <a:bodyPr/>
+                    <a:lstStyle/>
+                    <a:p>
+                      <a:pPr algn="l" fontAlgn="b"/>
+                      <a:r>
+                        <a:rPr lang="en-US" sz="1100" b="1" i="0" u="none" strike="noStrike">
+                          <a:latin typeface="Verdana"/>
+                        </a:rPr>
+                        <a:t>Miscellaneous Pledges of In-Kind $100 and under</a:t>
+                      </a:r>
+                    </a:p>
+                  </a:txBody>
+                  <a:tcPr marL="12700" marR="12700" marT="12700" marB="0" anchor="b"/>
+                </a:tc>
+                <a:tc>
+                  <a:txBody>
+                    <a:bodyPr/>
+                    <a:lstStyle/>
+                    <a:p>
+                      <a:pPr algn="r" fontAlgn="b"/>
+                      <a:r>
+                        <a:rPr lang="en-US" sz="1000" b="0" i="0" u="none" strike="noStrike">
+                          <a:latin typeface="Verdana"/>
+                        </a:rPr>
+                        <a:t>$456.00</a:t>
+                      </a:r>
+                    </a:p>
+                  </a:txBody>
+                  <a:tcPr marL="12700" marR="12700" marT="12700" marB="0" anchor="b"/>
+                </a:tc>
+              </a:tr>
+              <a:tr h="370840">
+                <a:tc>
+                  <a:txBody>
+                    <a:bodyPr/>
+                    <a:lstStyle/>
+                    <a:p>
+                      <a:pPr algn="l" fontAlgn="b"/>
+                      <a:r>
+                        <a:rPr lang="en-US" sz="1100" b="1" i="0" u="none" strike="noStrike">
+                          <a:latin typeface="Verdana"/>
+                        </a:rPr>
+                        <a:t>Misc Cash Contributions $100 and under</a:t>
+                      </a:r>
+                    </a:p>
+                  </a:txBody>
+                  <a:tcPr marL="12700" marR="12700" marT="12700" marB="0" anchor="b"/>
+                </a:tc>
+                <a:tc>
+                  <a:txBody>
+                    <a:bodyPr/>
+                    <a:lstStyle/>
+                    <a:p>
+                      <a:pPr algn="r" fontAlgn="b"/>
+                      <a:r>
+                        <a:rPr lang="en-US" sz="1000" b="0" i="0" u="none" strike="noStrike">
+                          <a:latin typeface="Verdana"/>
+                        </a:rPr>
+                        <a:t>$400.00</a:t>
+                      </a:r>
+                    </a:p>
+                  </a:txBody>
+                  <a:tcPr marL="12700" marR="12700" marT="12700" marB="0" anchor="b"/>
+                </a:tc>
+              </a:tr>
+              <a:tr h="370840">
+                <a:tc>
+                  <a:txBody>
+                    <a:bodyPr/>
+                    <a:lstStyle/>
+                    <a:p>
+                      <a:pPr algn="l" fontAlgn="b"/>
+                      <a:r>
+                        <a:rPr lang="en-US" sz="1100" b="0" i="0" u="none" strike="noStrike">
+                          <a:latin typeface="Verdana"/>
+                        </a:rPr>
+                        <a:t>Miscellaneous cash expenditures $100 and under</a:t>
+                      </a:r>
+                    </a:p>
+                  </a:txBody>
+                  <a:tcPr marL="12700" marR="12700" marT="12700" marB="0" anchor="b"/>
+                </a:tc>
+                <a:tc>
+                  <a:txBody>
+                    <a:bodyPr/>
+                    <a:lstStyle/>
+                    <a:p>
+                      <a:pPr algn="r" fontAlgn="b"/>
+                      <a:r>
+                        <a:rPr lang="en-US" sz="1000" b="0" i="0" u="none" strike="noStrike" dirty="0">
+                          <a:latin typeface="Verdana"/>
+                        </a:rPr>
+                        <a:t>$215.00</a:t>
+                      </a:r>
+                    </a:p>
+                  </a:txBody>
+                  <a:tcPr marL="12700" marR="12700" marT="12700" marB="0" anchor="b"/>
+                </a:tc>
+              </a:tr>
+            </a:tbl>
+          </a:graphicData>
+        </a:graphic>
+      </p:graphicFrame>
+    </p:spTree>
+  </p:cSld>
+  <p:clrMapOvr>
+    <a:masterClrMapping/>
+  </p:clrMapOvr>
+</p:sld>
+</file>
+
+<file path=ppt/slides/slide13.xml><?xml version="1.0" encoding="utf-8"?>
+<p:sld xmlns:a="http://schemas.openxmlformats.org/drawingml/2006/main" xmlns:r="http://schemas.openxmlformats.org/officeDocument/2006/relationships" xmlns:mc="http://schemas.openxmlformats.org/markup-compatibility/2006" xmlns:mv="urn:schemas-microsoft-com:mac:vml" xmlns:p="http://schemas.openxmlformats.org/presentationml/2006/main" mc:Ignorable="mv" mc:PreserveAttributes="mv:*">
+  <p:cSld>
+    <p:spTree>
+      <p:nvGrpSpPr>
+        <p:cNvPr id="1" name=""/>
+        <p:cNvGrpSpPr/>
+        <p:nvPr/>
+      </p:nvGrpSpPr>
+      <p:grpSpPr>
+        <a:xfrm>
+          <a:off x="0" y="0"/>
+          <a:ext cx="0" cy="0"/>
+          <a:chOff x="0" y="0"/>
+          <a:chExt cx="0" cy="0"/>
+        </a:xfrm>
+      </p:grpSpPr>
+      <p:sp>
+        <p:nvSpPr>
+          <p:cNvPr id="2" name="Title 1"/>
+          <p:cNvSpPr>
+            <a:spLocks noGrp="1"/>
+          </p:cNvSpPr>
+          <p:nvPr>
+            <p:ph type="title"/>
+          </p:nvPr>
+        </p:nvSpPr>
+        <p:spPr/>
+        <p:txBody>
+          <a:bodyPr/>
+          <a:lstStyle/>
+          <a:p>
+            <a:endParaRPr lang="en-US"/>
+          </a:p>
+        </p:txBody>
+      </p:sp>
+      <p:sp>
+        <p:nvSpPr>
+          <p:cNvPr id="3" name="Content Placeholder 2"/>
+          <p:cNvSpPr>
+            <a:spLocks noGrp="1"/>
+          </p:cNvSpPr>
+          <p:nvPr>
+            <p:ph idx="1"/>
+          </p:nvPr>
+        </p:nvSpPr>
+        <p:spPr/>
+        <p:txBody>
+          <a:bodyPr/>
+          <a:lstStyle/>
+          <a:p>
+            <a:endParaRPr lang="en-US"/>
+          </a:p>
+        </p:txBody>
+      </p:sp>
     </p:spTree>
   </p:cSld>
   <p:clrMapOvr>
@@ -9753,4 +11498,322 @@
   </a:objectDefaults>
   <a:extraClrSchemeLst/>
 </a:theme>
+</file>
+
+<file path=ppt/theme/theme2.xml><?xml version="1.0" encoding="utf-8"?>
+<a:theme xmlns:a="http://schemas.openxmlformats.org/drawingml/2006/main" name="Office Theme">
+  <a:themeElements>
+    <a:clrScheme name="Office">
+      <a:dk1>
+        <a:sysClr val="windowText" lastClr="000000"/>
+      </a:dk1>
+      <a:lt1>
+        <a:sysClr val="window" lastClr="FFFFFF"/>
+      </a:lt1>
+      <a:dk2>
+        <a:srgbClr val="1F497D"/>
+      </a:dk2>
+      <a:lt2>
+        <a:srgbClr val="EEECE1"/>
+      </a:lt2>
+      <a:accent1>
+        <a:srgbClr val="4F81BD"/>
+      </a:accent1>
+      <a:accent2>
+        <a:srgbClr val="C0504D"/>
+      </a:accent2>
+      <a:accent3>
+        <a:srgbClr val="9BBB59"/>
+      </a:accent3>
+      <a:accent4>
+        <a:srgbClr val="8064A2"/>
+      </a:accent4>
+      <a:accent5>
+        <a:srgbClr val="4BACC6"/>
+      </a:accent5>
+      <a:accent6>
+        <a:srgbClr val="F79646"/>
+      </a:accent6>
+      <a:hlink>
+        <a:srgbClr val="0000FF"/>
+      </a:hlink>
+      <a:folHlink>
+        <a:srgbClr val="800080"/>
+      </a:folHlink>
+    </a:clrScheme>
+    <a:fontScheme name="Office">
+      <a:majorFont>
+        <a:latin typeface="Calibri"/>
+        <a:ea typeface=""/>
+        <a:cs typeface=""/>
+        <a:font script="Jpan" typeface="ＭＳ Ｐゴシック"/>
+        <a:font script="Hang" typeface="맑은 고딕"/>
+        <a:font script="Hans" typeface="宋体"/>
+        <a:font script="Hant" typeface="新細明體"/>
+        <a:font script="Arab" typeface="Times New Roman"/>
+        <a:font script="Hebr" typeface="Times New Roman"/>
+        <a:font script="Thai" typeface="Angsana New"/>
+        <a:font script="Ethi" typeface="Nyala"/>
+        <a:font script="Beng" typeface="Vrinda"/>
+        <a:font script="Gujr" typeface="Shruti"/>
+        <a:font script="Khmr" typeface="MoolBoran"/>
+        <a:font script="Knda" typeface="Tunga"/>
+        <a:font script="Guru" typeface="Raavi"/>
+        <a:font script="Cans" typeface="Euphemia"/>
+        <a:font script="Cher" typeface="Plantagenet Cherokee"/>
+        <a:font script="Yiii" typeface="Microsoft Yi Baiti"/>
+        <a:font script="Tibt" typeface="Microsoft Himalaya"/>
+        <a:font script="Thaa" typeface="MV Boli"/>
+        <a:font script="Deva" typeface="Mangal"/>
+        <a:font script="Telu" typeface="Gautami"/>
+        <a:font script="Taml" typeface="Latha"/>
+        <a:font script="Syrc" typeface="Estrangelo Edessa"/>
+        <a:font script="Orya" typeface="Kalinga"/>
+        <a:font script="Mlym" typeface="Kartika"/>
+        <a:font script="Laoo" typeface="DokChampa"/>
+        <a:font script="Sinh" typeface="Iskoola Pota"/>
+        <a:font script="Mong" typeface="Mongolian Baiti"/>
+        <a:font script="Viet" typeface="Times New Roman"/>
+        <a:font script="Uigh" typeface="Microsoft Uighur"/>
+      </a:majorFont>
+      <a:minorFont>
+        <a:latin typeface="Calibri"/>
+        <a:ea typeface=""/>
+        <a:cs typeface=""/>
+        <a:font script="Jpan" typeface="ＭＳ Ｐゴシック"/>
+        <a:font script="Hang" typeface="맑은 고딕"/>
+        <a:font script="Hans" typeface="宋体"/>
+        <a:font script="Hant" typeface="新細明體"/>
+        <a:font script="Arab" typeface="Arial"/>
+        <a:font script="Hebr" typeface="Arial"/>
+        <a:font script="Thai" typeface="Cordia New"/>
+        <a:font script="Ethi" typeface="Nyala"/>
+        <a:font script="Beng" typeface="Vrinda"/>
+        <a:font script="Gujr" typeface="Shruti"/>
+        <a:font script="Khmr" typeface="DaunPenh"/>
+        <a:font script="Knda" typeface="Tunga"/>
+        <a:font script="Guru" typeface="Raavi"/>
+        <a:font script="Cans" typeface="Euphemia"/>
+        <a:font script="Cher" typeface="Plantagenet Cherokee"/>
+        <a:font script="Yiii" typeface="Microsoft Yi Baiti"/>
+        <a:font script="Tibt" typeface="Microsoft Himalaya"/>
+        <a:font script="Thaa" typeface="MV Boli"/>
+        <a:font script="Deva" typeface="Mangal"/>
+        <a:font script="Telu" typeface="Gautami"/>
+        <a:font script="Taml" typeface="Latha"/>
+        <a:font script="Syrc" typeface="Estrangelo Edessa"/>
+        <a:font script="Orya" typeface="Kalinga"/>
+        <a:font script="Mlym" typeface="Kartika"/>
+        <a:font script="Laoo" typeface="DokChampa"/>
+        <a:font script="Sinh" typeface="Iskoola Pota"/>
+        <a:font script="Mong" typeface="Mongolian Baiti"/>
+        <a:font script="Viet" typeface="Arial"/>
+        <a:font script="Uigh" typeface="Microsoft Uighur"/>
+      </a:minorFont>
+    </a:fontScheme>
+    <a:fmtScheme name="Office">
+      <a:fillStyleLst>
+        <a:solidFill>
+          <a:schemeClr val="phClr"/>
+        </a:solidFill>
+        <a:gradFill rotWithShape="1">
+          <a:gsLst>
+            <a:gs pos="0">
+              <a:schemeClr val="phClr">
+                <a:tint val="50000"/>
+                <a:satMod val="300000"/>
+              </a:schemeClr>
+            </a:gs>
+            <a:gs pos="35000">
+              <a:schemeClr val="phClr">
+                <a:tint val="37000"/>
+                <a:satMod val="300000"/>
+              </a:schemeClr>
+            </a:gs>
+            <a:gs pos="100000">
+              <a:schemeClr val="phClr">
+                <a:tint val="15000"/>
+                <a:satMod val="350000"/>
+              </a:schemeClr>
+            </a:gs>
+          </a:gsLst>
+          <a:lin ang="16200000" scaled="1"/>
+        </a:gradFill>
+        <a:gradFill rotWithShape="1">
+          <a:gsLst>
+            <a:gs pos="0">
+              <a:schemeClr val="phClr">
+                <a:tint val="100000"/>
+                <a:shade val="100000"/>
+                <a:satMod val="130000"/>
+              </a:schemeClr>
+            </a:gs>
+            <a:gs pos="100000">
+              <a:schemeClr val="phClr">
+                <a:tint val="50000"/>
+                <a:shade val="100000"/>
+                <a:satMod val="350000"/>
+              </a:schemeClr>
+            </a:gs>
+          </a:gsLst>
+          <a:lin ang="16200000" scaled="0"/>
+        </a:gradFill>
+      </a:fillStyleLst>
+      <a:lnStyleLst>
+        <a:ln w="9525" cap="flat" cmpd="sng" algn="ctr">
+          <a:solidFill>
+            <a:schemeClr val="phClr">
+              <a:shade val="95000"/>
+              <a:satMod val="105000"/>
+            </a:schemeClr>
+          </a:solidFill>
+          <a:prstDash val="solid"/>
+        </a:ln>
+        <a:ln w="25400" cap="flat" cmpd="sng" algn="ctr">
+          <a:solidFill>
+            <a:schemeClr val="phClr"/>
+          </a:solidFill>
+          <a:prstDash val="solid"/>
+        </a:ln>
+        <a:ln w="38100" cap="flat" cmpd="sng" algn="ctr">
+          <a:solidFill>
+            <a:schemeClr val="phClr"/>
+          </a:solidFill>
+          <a:prstDash val="solid"/>
+        </a:ln>
+      </a:lnStyleLst>
+      <a:effectStyleLst>
+        <a:effectStyle>
+          <a:effectLst>
+            <a:outerShdw blurRad="40000" dist="20000" dir="5400000" rotWithShape="0">
+              <a:srgbClr val="000000">
+                <a:alpha val="38000"/>
+              </a:srgbClr>
+            </a:outerShdw>
+          </a:effectLst>
+        </a:effectStyle>
+        <a:effectStyle>
+          <a:effectLst>
+            <a:outerShdw blurRad="40000" dist="23000" dir="5400000" rotWithShape="0">
+              <a:srgbClr val="000000">
+                <a:alpha val="35000"/>
+              </a:srgbClr>
+            </a:outerShdw>
+          </a:effectLst>
+        </a:effectStyle>
+        <a:effectStyle>
+          <a:effectLst>
+            <a:outerShdw blurRad="40000" dist="23000" dir="5400000" rotWithShape="0">
+              <a:srgbClr val="000000">
+                <a:alpha val="35000"/>
+              </a:srgbClr>
+            </a:outerShdw>
+          </a:effectLst>
+          <a:scene3d>
+            <a:camera prst="orthographicFront">
+              <a:rot lat="0" lon="0" rev="0"/>
+            </a:camera>
+            <a:lightRig rig="threePt" dir="t">
+              <a:rot lat="0" lon="0" rev="1200000"/>
+            </a:lightRig>
+          </a:scene3d>
+          <a:sp3d>
+            <a:bevelT w="63500" h="25400"/>
+          </a:sp3d>
+        </a:effectStyle>
+      </a:effectStyleLst>
+      <a:bgFillStyleLst>
+        <a:solidFill>
+          <a:schemeClr val="phClr"/>
+        </a:solidFill>
+        <a:gradFill rotWithShape="1">
+          <a:gsLst>
+            <a:gs pos="0">
+              <a:schemeClr val="phClr">
+                <a:tint val="40000"/>
+                <a:satMod val="350000"/>
+              </a:schemeClr>
+            </a:gs>
+            <a:gs pos="40000">
+              <a:schemeClr val="phClr">
+                <a:tint val="45000"/>
+                <a:shade val="99000"/>
+                <a:satMod val="350000"/>
+              </a:schemeClr>
+            </a:gs>
+            <a:gs pos="100000">
+              <a:schemeClr val="phClr">
+                <a:shade val="20000"/>
+                <a:satMod val="255000"/>
+              </a:schemeClr>
+            </a:gs>
+          </a:gsLst>
+          <a:path path="circle">
+            <a:fillToRect l="50000" t="-80000" r="50000" b="180000"/>
+          </a:path>
+        </a:gradFill>
+        <a:gradFill rotWithShape="1">
+          <a:gsLst>
+            <a:gs pos="0">
+              <a:schemeClr val="phClr">
+                <a:tint val="80000"/>
+                <a:satMod val="300000"/>
+              </a:schemeClr>
+            </a:gs>
+            <a:gs pos="100000">
+              <a:schemeClr val="phClr">
+                <a:shade val="30000"/>
+                <a:satMod val="200000"/>
+              </a:schemeClr>
+            </a:gs>
+          </a:gsLst>
+          <a:path path="circle">
+            <a:fillToRect l="50000" t="50000" r="50000" b="50000"/>
+          </a:path>
+        </a:gradFill>
+      </a:bgFillStyleLst>
+    </a:fmtScheme>
+  </a:themeElements>
+  <a:objectDefaults>
+    <a:spDef>
+      <a:spPr/>
+      <a:bodyPr/>
+      <a:lstStyle/>
+      <a:style>
+        <a:lnRef idx="1">
+          <a:schemeClr val="accent1"/>
+        </a:lnRef>
+        <a:fillRef idx="3">
+          <a:schemeClr val="accent1"/>
+        </a:fillRef>
+        <a:effectRef idx="2">
+          <a:schemeClr val="accent1"/>
+        </a:effectRef>
+        <a:fontRef idx="minor">
+          <a:schemeClr val="lt1"/>
+        </a:fontRef>
+      </a:style>
+    </a:spDef>
+    <a:lnDef>
+      <a:spPr/>
+      <a:bodyPr/>
+      <a:lstStyle/>
+      <a:style>
+        <a:lnRef idx="2">
+          <a:schemeClr val="accent1"/>
+        </a:lnRef>
+        <a:fillRef idx="0">
+          <a:schemeClr val="accent1"/>
+        </a:fillRef>
+        <a:effectRef idx="1">
+          <a:schemeClr val="accent1"/>
+        </a:effectRef>
+        <a:fontRef idx="minor">
+          <a:schemeClr val="tx1"/>
+        </a:fontRef>
+      </a:style>
+    </a:lnDef>
+  </a:objectDefaults>
+  <a:extraClrSchemeLst/>
+</a:theme>
 </file>
</xml_diff>

<commit_message>
adjusted candidate_detail grass roots calculation
</commit_message>
<xml_diff>
--- a/dataNotes.pptx
+++ b/dataNotes.pptx
@@ -470,6 +470,87 @@
 </file>
 
 <file path=ppt/notesSlides/notesSlide1.xml><?xml version="1.0" encoding="utf-8"?>
+<p:notes xmlns:a="http://schemas.openxmlformats.org/drawingml/2006/main" xmlns:r="http://schemas.openxmlformats.org/officeDocument/2006/relationships" xmlns:mc="http://schemas.openxmlformats.org/markup-compatibility/2006" xmlns:mv="urn:schemas-microsoft-com:mac:vml" xmlns:p="http://schemas.openxmlformats.org/presentationml/2006/main" mc:Ignorable="mv" mc:PreserveAttributes="mv:*">
+  <p:cSld>
+    <p:spTree>
+      <p:nvGrpSpPr>
+        <p:cNvPr id="1" name=""/>
+        <p:cNvGrpSpPr/>
+        <p:nvPr/>
+      </p:nvGrpSpPr>
+      <p:grpSpPr>
+        <a:xfrm>
+          <a:off x="0" y="0"/>
+          <a:ext cx="0" cy="0"/>
+          <a:chOff x="0" y="0"/>
+          <a:chExt cx="0" cy="0"/>
+        </a:xfrm>
+      </p:grpSpPr>
+      <p:sp>
+        <p:nvSpPr>
+          <p:cNvPr id="2" name="Slide Image Placeholder 1"/>
+          <p:cNvSpPr>
+            <a:spLocks noGrp="1" noRot="1" noChangeAspect="1"/>
+          </p:cNvSpPr>
+          <p:nvPr>
+            <p:ph type="sldImg"/>
+          </p:nvPr>
+        </p:nvSpPr>
+        <p:spPr/>
+      </p:sp>
+      <p:sp>
+        <p:nvSpPr>
+          <p:cNvPr id="3" name="Notes Placeholder 2"/>
+          <p:cNvSpPr>
+            <a:spLocks noGrp="1"/>
+          </p:cNvSpPr>
+          <p:nvPr>
+            <p:ph type="body" idx="1"/>
+          </p:nvPr>
+        </p:nvSpPr>
+        <p:spPr/>
+        <p:txBody>
+          <a:bodyPr>
+            <a:normAutofit/>
+          </a:bodyPr>
+          <a:lstStyle/>
+          <a:p>
+            <a:endParaRPr lang="en-US" dirty="0"/>
+          </a:p>
+        </p:txBody>
+      </p:sp>
+      <p:sp>
+        <p:nvSpPr>
+          <p:cNvPr id="4" name="Slide Number Placeholder 3"/>
+          <p:cNvSpPr>
+            <a:spLocks noGrp="1"/>
+          </p:cNvSpPr>
+          <p:nvPr>
+            <p:ph type="sldNum" sz="quarter" idx="10"/>
+          </p:nvPr>
+        </p:nvSpPr>
+        <p:spPr/>
+        <p:txBody>
+          <a:bodyPr/>
+          <a:lstStyle/>
+          <a:p>
+            <a:fld id="{F0126D94-F4B7-A842-8164-58B78F1F8011}" type="slidenum">
+              <a:rPr lang="en-US" smtClean="0"/>
+              <a:t>11</a:t>
+            </a:fld>
+            <a:endParaRPr lang="en-US"/>
+          </a:p>
+        </p:txBody>
+      </p:sp>
+    </p:spTree>
+  </p:cSld>
+  <p:clrMapOvr>
+    <a:masterClrMapping/>
+  </p:clrMapOvr>
+</p:notes>
+</file>
+
+<file path=ppt/notesSlides/notesSlide2.xml><?xml version="1.0" encoding="utf-8"?>
 <p:notes xmlns:a="http://schemas.openxmlformats.org/drawingml/2006/main" xmlns:r="http://schemas.openxmlformats.org/officeDocument/2006/relationships" xmlns:mc="http://schemas.openxmlformats.org/markup-compatibility/2006" xmlns:mv="urn:schemas-microsoft-com:mac:vml" xmlns:p="http://schemas.openxmlformats.org/presentationml/2006/main" mc:Ignorable="mv" mc:PreserveAttributes="mv:*">
   <p:cSld>
     <p:spTree>

</xml_diff>